<commit_message>
Informationen zu pom.xml und properties hinzugefügt
</commit_message>
<xml_diff>
--- a/Fragebogen zum Status der Bauqualität.pptx
+++ b/Fragebogen zum Status der Bauqualität.pptx
@@ -280,7 +280,7 @@
           <a:p>
             <a:fld id="{48A87A34-81AB-432B-8DAE-1953F412C126}" type="datetimeFigureOut">
               <a:rPr lang="en-US" dirty="0"/>
-              <a:t>12/17/2018</a:t>
+              <a:t>12/18/2018</a:t>
             </a:fld>
             <a:endParaRPr lang="en-US" dirty="0"/>
           </a:p>
@@ -495,7 +495,7 @@
           <a:p>
             <a:fld id="{48A87A34-81AB-432B-8DAE-1953F412C126}" type="datetimeFigureOut">
               <a:rPr lang="en-US" dirty="0"/>
-              <a:t>12/17/2018</a:t>
+              <a:t>12/18/2018</a:t>
             </a:fld>
             <a:endParaRPr lang="en-US" dirty="0"/>
           </a:p>
@@ -714,7 +714,7 @@
           <a:p>
             <a:fld id="{48A87A34-81AB-432B-8DAE-1953F412C126}" type="datetimeFigureOut">
               <a:rPr lang="en-US" dirty="0"/>
-              <a:t>12/17/2018</a:t>
+              <a:t>12/18/2018</a:t>
             </a:fld>
             <a:endParaRPr lang="en-US" dirty="0"/>
           </a:p>
@@ -924,7 +924,7 @@
             <a:fld id="{48A87A34-81AB-432B-8DAE-1953F412C126}" type="datetimeFigureOut">
               <a:rPr lang="en-US" dirty="0"/>
               <a:pPr/>
-              <a:t>12/17/2018</a:t>
+              <a:t>12/18/2018</a:t>
             </a:fld>
             <a:endParaRPr lang="en-US" dirty="0"/>
           </a:p>
@@ -1211,7 +1211,7 @@
           <a:p>
             <a:fld id="{48A87A34-81AB-432B-8DAE-1953F412C126}" type="datetimeFigureOut">
               <a:rPr lang="en-US" dirty="0"/>
-              <a:t>12/17/2018</a:t>
+              <a:t>12/18/2018</a:t>
             </a:fld>
             <a:endParaRPr lang="en-US" dirty="0"/>
           </a:p>
@@ -1483,7 +1483,7 @@
           <a:p>
             <a:fld id="{48A87A34-81AB-432B-8DAE-1953F412C126}" type="datetimeFigureOut">
               <a:rPr lang="en-US" dirty="0"/>
-              <a:t>12/17/2018</a:t>
+              <a:t>12/18/2018</a:t>
             </a:fld>
             <a:endParaRPr lang="en-US" dirty="0"/>
           </a:p>
@@ -1903,7 +1903,7 @@
           <a:p>
             <a:fld id="{48A87A34-81AB-432B-8DAE-1953F412C126}" type="datetimeFigureOut">
               <a:rPr lang="en-US" dirty="0"/>
-              <a:t>12/17/2018</a:t>
+              <a:t>12/18/2018</a:t>
             </a:fld>
             <a:endParaRPr lang="en-US" dirty="0"/>
           </a:p>
@@ -2056,7 +2056,7 @@
           <a:p>
             <a:fld id="{48A87A34-81AB-432B-8DAE-1953F412C126}" type="datetimeFigureOut">
               <a:rPr lang="en-US" dirty="0"/>
-              <a:t>12/17/2018</a:t>
+              <a:t>12/18/2018</a:t>
             </a:fld>
             <a:endParaRPr lang="en-US" dirty="0"/>
           </a:p>
@@ -2186,7 +2186,7 @@
           <a:p>
             <a:fld id="{48A87A34-81AB-432B-8DAE-1953F412C126}" type="datetimeFigureOut">
               <a:rPr lang="en-US" dirty="0"/>
-              <a:t>12/17/2018</a:t>
+              <a:t>12/18/2018</a:t>
             </a:fld>
             <a:endParaRPr lang="en-US" dirty="0"/>
           </a:p>
@@ -2432,7 +2432,7 @@
           <a:p>
             <a:fld id="{48A87A34-81AB-432B-8DAE-1953F412C126}" type="datetimeFigureOut">
               <a:rPr lang="en-US" dirty="0"/>
-              <a:t>12/17/2018</a:t>
+              <a:t>12/18/2018</a:t>
             </a:fld>
             <a:endParaRPr lang="en-US" dirty="0"/>
           </a:p>
@@ -2888,7 +2888,7 @@
             <a:fld id="{48A87A34-81AB-432B-8DAE-1953F412C126}" type="datetimeFigureOut">
               <a:rPr lang="en-US" dirty="0"/>
               <a:pPr/>
-              <a:t>12/17/2018</a:t>
+              <a:t>12/18/2018</a:t>
             </a:fld>
             <a:endParaRPr lang="en-US" dirty="0"/>
           </a:p>
@@ -3265,7 +3265,7 @@
             <a:fld id="{48A87A34-81AB-432B-8DAE-1953F412C126}" type="datetimeFigureOut">
               <a:rPr lang="en-US" dirty="0"/>
               <a:pPr/>
-              <a:t>12/17/2018</a:t>
+              <a:t>12/18/2018</a:t>
             </a:fld>
             <a:endParaRPr lang="en-US" dirty="0"/>
           </a:p>
@@ -12509,7 +12509,7 @@
         </p:nvSpPr>
         <p:spPr>
           <a:xfrm>
-            <a:off x="1241461" y="966275"/>
+            <a:off x="1273545" y="817010"/>
             <a:ext cx="4645152" cy="801943"/>
           </a:xfrm>
         </p:spPr>
@@ -12542,7 +12542,7 @@
         </p:nvSpPr>
         <p:spPr>
           <a:xfrm>
-            <a:off x="6199549" y="966275"/>
+            <a:off x="6199549" y="817010"/>
             <a:ext cx="4645152" cy="802237"/>
           </a:xfrm>
         </p:spPr>
@@ -12580,7 +12580,7 @@
         </p:blipFill>
         <p:spPr>
           <a:xfrm>
-            <a:off x="555489" y="2255418"/>
+            <a:off x="515384" y="1726028"/>
             <a:ext cx="3894157" cy="2347163"/>
           </a:xfrm>
           <a:prstGeom prst="rect">
@@ -12610,7 +12610,7 @@
         </p:blipFill>
         <p:spPr>
           <a:xfrm>
-            <a:off x="5357826" y="2247797"/>
+            <a:off x="5345551" y="1718407"/>
             <a:ext cx="5486875" cy="1181202"/>
           </a:xfrm>
           <a:prstGeom prst="rect">
@@ -12618,6 +12618,132 @@
           </a:prstGeom>
         </p:spPr>
       </p:pic>
+      <p:sp>
+        <p:nvSpPr>
+          <p:cNvPr id="2" name="Textfeld 1">
+            <a:extLst>
+              <a:ext uri="{FF2B5EF4-FFF2-40B4-BE49-F238E27FC236}">
+                <a16:creationId xmlns:a16="http://schemas.microsoft.com/office/drawing/2014/main" id="{2ACF7699-04C2-48EF-BAC3-1BF36C9E34F8}"/>
+              </a:ext>
+            </a:extLst>
+          </p:cNvPr>
+          <p:cNvSpPr txBox="1"/>
+          <p:nvPr/>
+        </p:nvSpPr>
+        <p:spPr>
+          <a:xfrm>
+            <a:off x="515384" y="4211053"/>
+            <a:ext cx="3894157" cy="1200329"/>
+          </a:xfrm>
+          <a:prstGeom prst="rect">
+            <a:avLst/>
+          </a:prstGeom>
+          <a:noFill/>
+        </p:spPr>
+        <p:txBody>
+          <a:bodyPr wrap="square" rtlCol="0">
+            <a:spAutoFit/>
+          </a:bodyPr>
+          <a:lstStyle/>
+          <a:p>
+            <a:pPr marL="285750" indent="-285750">
+              <a:buFont typeface="Arial" panose="020B0604020202020204" pitchFamily="34" charset="0"/>
+              <a:buChar char="•"/>
+            </a:pPr>
+            <a:r>
+              <a:rPr lang="de-DE" dirty="0"/>
+              <a:t>Project </a:t>
+            </a:r>
+            <a:r>
+              <a:rPr lang="de-DE" dirty="0" err="1"/>
+              <a:t>Object</a:t>
+            </a:r>
+            <a:r>
+              <a:rPr lang="de-DE" dirty="0"/>
+              <a:t> Model</a:t>
+            </a:r>
+          </a:p>
+          <a:p>
+            <a:pPr marL="285750" indent="-285750">
+              <a:buFont typeface="Arial" panose="020B0604020202020204" pitchFamily="34" charset="0"/>
+              <a:buChar char="•"/>
+            </a:pPr>
+            <a:r>
+              <a:rPr lang="de-DE" dirty="0"/>
+              <a:t>Konfiguration des Projektes </a:t>
+            </a:r>
+          </a:p>
+          <a:p>
+            <a:pPr marL="742950" lvl="1" indent="-285750">
+              <a:buFont typeface="Arial" panose="020B0604020202020204" pitchFamily="34" charset="0"/>
+              <a:buChar char="•"/>
+            </a:pPr>
+            <a:r>
+              <a:rPr lang="de-DE" dirty="0"/>
+              <a:t>Abhängigkeiten</a:t>
+            </a:r>
+          </a:p>
+          <a:p>
+            <a:pPr marL="742950" lvl="1" indent="-285750">
+              <a:buFont typeface="Arial" panose="020B0604020202020204" pitchFamily="34" charset="0"/>
+              <a:buChar char="•"/>
+            </a:pPr>
+            <a:r>
+              <a:rPr lang="de-DE" dirty="0"/>
+              <a:t>Projektdetails</a:t>
+            </a:r>
+          </a:p>
+        </p:txBody>
+      </p:sp>
+      <p:sp>
+        <p:nvSpPr>
+          <p:cNvPr id="4" name="Textfeld 3">
+            <a:extLst>
+              <a:ext uri="{FF2B5EF4-FFF2-40B4-BE49-F238E27FC236}">
+                <a16:creationId xmlns:a16="http://schemas.microsoft.com/office/drawing/2014/main" id="{FA669660-EE14-4B53-B3F7-90D3D04D6C0C}"/>
+              </a:ext>
+            </a:extLst>
+          </p:cNvPr>
+          <p:cNvSpPr txBox="1"/>
+          <p:nvPr/>
+        </p:nvSpPr>
+        <p:spPr>
+          <a:xfrm>
+            <a:off x="5345551" y="3059668"/>
+            <a:ext cx="5499150" cy="646331"/>
+          </a:xfrm>
+          <a:prstGeom prst="rect">
+            <a:avLst/>
+          </a:prstGeom>
+          <a:noFill/>
+        </p:spPr>
+        <p:txBody>
+          <a:bodyPr wrap="square" rtlCol="0">
+            <a:spAutoFit/>
+          </a:bodyPr>
+          <a:lstStyle/>
+          <a:p>
+            <a:pPr marL="285750" indent="-285750">
+              <a:buFont typeface="Arial" panose="020B0604020202020204" pitchFamily="34" charset="0"/>
+              <a:buChar char="•"/>
+            </a:pPr>
+            <a:r>
+              <a:rPr lang="de-DE" dirty="0"/>
+              <a:t>Eigenschaften des Projektes</a:t>
+            </a:r>
+          </a:p>
+          <a:p>
+            <a:pPr marL="742950" lvl="1" indent="-285750">
+              <a:buFont typeface="Arial" panose="020B0604020202020204" pitchFamily="34" charset="0"/>
+              <a:buChar char="•"/>
+            </a:pPr>
+            <a:r>
+              <a:rPr lang="de-DE" dirty="0"/>
+              <a:t>zum Beispiel Datenbankanbindung</a:t>
+            </a:r>
+          </a:p>
+        </p:txBody>
+      </p:sp>
     </p:spTree>
     <p:extLst>
       <p:ext uri="{BB962C8B-B14F-4D97-AF65-F5344CB8AC3E}">

</xml_diff>